<commit_message>
make display as default in pptx, remove unused pptx
</commit_message>
<xml_diff>
--- a/linguappt/en/templates/vocab_english_classic.pptx
+++ b/linguappt/en/templates/vocab_english_classic.pptx
@@ -5,11 +5,8 @@
     <p:sldMasterId id="2147483852" r:id="rId1"/>
   </p:sldMasterIdLst>
   <p:notesMasterIdLst>
-    <p:notesMasterId r:id="rId3"/>
+    <p:notesMasterId r:id="rId2"/>
   </p:notesMasterIdLst>
-  <p:sldIdLst>
-    <p:sldId id="256" r:id="rId2"/>
-  </p:sldIdLst>
   <p:sldSz cx="12192000" cy="6858000"/>
   <p:notesSz cx="6858000" cy="9144000"/>
   <p:defaultTextStyle>
@@ -211,7 +208,7 @@
           <a:p>
             <a:fld id="{49827307-2D32-1C49-A664-3E09AADAF8D1}" type="datetimeFigureOut">
               <a:rPr lang="en-CN" smtClean="0"/>
-              <a:t>4/2/21</a:t>
+              <a:t>2021/4/20</a:t>
             </a:fld>
             <a:endParaRPr lang="en-CN"/>
           </a:p>
@@ -12744,86 +12741,6 @@
     </p:ext>
   </p:extLst>
 </p:sldMaster>
-</file>
-
-<file path=ppt/slides/slide1.xml><?xml version="1.0" encoding="utf-8"?>
-<p:sld xmlns:a="http://schemas.openxmlformats.org/drawingml/2006/main" xmlns:r="http://schemas.openxmlformats.org/officeDocument/2006/relationships" xmlns:p="http://schemas.openxmlformats.org/presentationml/2006/main">
-  <p:cSld>
-    <p:spTree>
-      <p:nvGrpSpPr>
-        <p:cNvPr id="1" name=""/>
-        <p:cNvGrpSpPr/>
-        <p:nvPr/>
-      </p:nvGrpSpPr>
-      <p:grpSpPr>
-        <a:xfrm>
-          <a:off x="0" y="0"/>
-          <a:ext cx="0" cy="0"/>
-          <a:chOff x="0" y="0"/>
-          <a:chExt cx="0" cy="0"/>
-        </a:xfrm>
-      </p:grpSpPr>
-      <p:sp>
-        <p:nvSpPr>
-          <p:cNvPr id="2" name="Text Placeholder 1">
-            <a:extLst>
-              <a:ext uri="{FF2B5EF4-FFF2-40B4-BE49-F238E27FC236}">
-                <a16:creationId xmlns:a16="http://schemas.microsoft.com/office/drawing/2014/main" id="{F4379AFC-3307-9B42-BA15-159151239110}"/>
-              </a:ext>
-            </a:extLst>
-          </p:cNvPr>
-          <p:cNvSpPr>
-            <a:spLocks noGrp="1"/>
-          </p:cNvSpPr>
-          <p:nvPr>
-            <p:ph type="body" sz="quarter" idx="10"/>
-          </p:nvPr>
-        </p:nvSpPr>
-        <p:spPr/>
-        <p:txBody>
-          <a:bodyPr/>
-          <a:lstStyle/>
-          <a:p>
-            <a:endParaRPr lang="en-JP"/>
-          </a:p>
-        </p:txBody>
-      </p:sp>
-      <p:sp>
-        <p:nvSpPr>
-          <p:cNvPr id="3" name="Text Placeholder 2">
-            <a:extLst>
-              <a:ext uri="{FF2B5EF4-FFF2-40B4-BE49-F238E27FC236}">
-                <a16:creationId xmlns:a16="http://schemas.microsoft.com/office/drawing/2014/main" id="{0B33966C-15D2-1145-AC0D-53E65A409C6F}"/>
-              </a:ext>
-            </a:extLst>
-          </p:cNvPr>
-          <p:cNvSpPr>
-            <a:spLocks noGrp="1"/>
-          </p:cNvSpPr>
-          <p:nvPr>
-            <p:ph type="body" sz="quarter" idx="11"/>
-          </p:nvPr>
-        </p:nvSpPr>
-        <p:spPr/>
-        <p:txBody>
-          <a:bodyPr/>
-          <a:lstStyle/>
-          <a:p>
-            <a:endParaRPr lang="en-JP"/>
-          </a:p>
-        </p:txBody>
-      </p:sp>
-    </p:spTree>
-    <p:extLst>
-      <p:ext uri="{BB962C8B-B14F-4D97-AF65-F5344CB8AC3E}">
-        <p14:creationId xmlns:p14="http://schemas.microsoft.com/office/powerpoint/2010/main" val="4000489959"/>
-      </p:ext>
-    </p:extLst>
-  </p:cSld>
-  <p:clrMapOvr>
-    <a:masterClrMapping/>
-  </p:clrMapOvr>
-</p:sld>
 </file>
 
 <file path=ppt/theme/theme1.xml><?xml version="1.0" encoding="utf-8"?>

</xml_diff>